<commit_message>
todo 1 and 2
</commit_message>
<xml_diff>
--- a/proj5_release/proj5_template.pptx
+++ b/proj5_release/proj5_template.pptx
@@ -1467,8 +1467,8 @@
         </p:nvSpPr>
         <p:spPr>
           <a:xfrm>
-            <a:off x="1143221" y="685795"/>
-            <a:ext cx="4572300" cy="3429000"/>
+            <a:off x="381000" y="685800"/>
+            <a:ext cx="6096000" cy="3429000"/>
           </a:xfrm>
           <a:custGeom>
             <a:avLst/>
@@ -1964,7 +1964,7 @@
         </p:nvSpPr>
         <p:spPr>
           <a:xfrm>
-            <a:off x="381300" y="685800"/>
+            <a:off x="381000" y="685800"/>
             <a:ext cx="6096000" cy="3429000"/>
           </a:xfrm>
           <a:custGeom>
@@ -2068,7 +2068,7 @@
         </p:nvSpPr>
         <p:spPr>
           <a:xfrm>
-            <a:off x="381300" y="685800"/>
+            <a:off x="381000" y="685800"/>
             <a:ext cx="6096000" cy="3429000"/>
           </a:xfrm>
           <a:custGeom>
@@ -2172,7 +2172,7 @@
         </p:nvSpPr>
         <p:spPr>
           <a:xfrm>
-            <a:off x="381300" y="685800"/>
+            <a:off x="381000" y="685800"/>
             <a:ext cx="6096000" cy="3429000"/>
           </a:xfrm>
           <a:custGeom>
@@ -8910,25 +8910,14 @@
               </a:spcAft>
               <a:buNone/>
             </a:pPr>
-            <a:endParaRPr dirty="0">
-              <a:solidFill>
-                <a:schemeClr val="dk2"/>
-              </a:solidFill>
-            </a:endParaRPr>
-          </a:p>
-          <a:p>
-            <a:pPr marL="0" marR="0" lvl="0" indent="0" algn="l" rtl="0">
-              <a:lnSpc>
-                <a:spcPct val="115000"/>
-              </a:lnSpc>
-              <a:spcBef>
-                <a:spcPts val="1200"/>
-              </a:spcBef>
-              <a:spcAft>
-                <a:spcPts val="0"/>
-              </a:spcAft>
-              <a:buNone/>
-            </a:pPr>
+            <a:r>
+              <a:rPr lang="en-US" dirty="0">
+                <a:solidFill>
+                  <a:schemeClr val="dk2"/>
+                </a:solidFill>
+              </a:rPr>
+              <a:t>From calculating the fundamental matrix, the camera center coordinates can be obtained and charted over time to determine the camera’s coordinates.</a:t>
+            </a:r>
             <a:endParaRPr dirty="0">
               <a:solidFill>
                 <a:schemeClr val="dk2"/>
@@ -8995,11 +8984,14 @@
               </a:spcAft>
               <a:buNone/>
             </a:pPr>
-            <a:endParaRPr lang="en-US" dirty="0">
-              <a:solidFill>
-                <a:schemeClr val="dk2"/>
-              </a:solidFill>
-            </a:endParaRPr>
+            <a:r>
+              <a:rPr lang="en-US" dirty="0">
+                <a:solidFill>
+                  <a:schemeClr val="dk2"/>
+                </a:solidFill>
+              </a:rPr>
+              <a:t>The function returns 20 poses.</a:t>
+            </a:r>
           </a:p>
           <a:p>
             <a:pPr marL="0" marR="0" lvl="0" indent="0" algn="l" rtl="0">
@@ -9053,6 +9045,39 @@
               </a:rPr>
               <a:t> function return?]</a:t>
             </a:r>
+          </a:p>
+          <a:p>
+            <a:pPr>
+              <a:lnSpc>
+                <a:spcPct val="115000"/>
+              </a:lnSpc>
+              <a:spcBef>
+                <a:spcPts val="1200"/>
+              </a:spcBef>
+            </a:pPr>
+            <a:r>
+              <a:rPr lang="en-IN" dirty="0">
+                <a:solidFill>
+                  <a:schemeClr val="dk2"/>
+                </a:solidFill>
+              </a:rPr>
+              <a:t>The function returns 20 poses.</a:t>
+            </a:r>
+          </a:p>
+          <a:p>
+            <a:pPr>
+              <a:lnSpc>
+                <a:spcPct val="115000"/>
+              </a:lnSpc>
+              <a:spcBef>
+                <a:spcPts val="1200"/>
+              </a:spcBef>
+            </a:pPr>
+            <a:endParaRPr lang="en-IN" dirty="0">
+              <a:solidFill>
+                <a:schemeClr val="dk2"/>
+              </a:solidFill>
+            </a:endParaRPr>
           </a:p>
           <a:p>
             <a:pPr marL="0" marR="0" lvl="0" indent="0" algn="l" rtl="0">
@@ -9192,14 +9217,14 @@
               <a:buNone/>
             </a:pPr>
             <a:r>
-              <a:rPr lang="en" sz="2800">
+              <a:rPr lang="en" sz="2800" dirty="0">
                 <a:solidFill>
                   <a:schemeClr val="dk1"/>
                 </a:solidFill>
               </a:rPr>
               <a:t>Part 5: Visual odometry</a:t>
             </a:r>
-            <a:endParaRPr sz="2800">
+            <a:endParaRPr sz="2800" dirty="0">
               <a:solidFill>
                 <a:schemeClr val="dk1"/>
               </a:solidFill>
@@ -9218,7 +9243,7 @@
               </a:spcAft>
               <a:buNone/>
             </a:pPr>
-            <a:endParaRPr sz="2800"/>
+            <a:endParaRPr sz="2800" dirty="0"/>
           </a:p>
         </p:txBody>
       </p:sp>
@@ -9351,6 +9376,36 @@
           </a:p>
         </p:txBody>
       </p:sp>
+      <p:pic>
+        <p:nvPicPr>
+          <p:cNvPr id="5" name="Picture 4" descr="Chart&#10;&#10;Description automatically generated with medium confidence">
+            <a:extLst>
+              <a:ext uri="{FF2B5EF4-FFF2-40B4-BE49-F238E27FC236}">
+                <a16:creationId xmlns:a16="http://schemas.microsoft.com/office/drawing/2014/main" id="{CA083703-DBBB-C342-8E5B-259079307C01}"/>
+              </a:ext>
+            </a:extLst>
+          </p:cNvPr>
+          <p:cNvPicPr>
+            <a:picLocks noChangeAspect="1"/>
+          </p:cNvPicPr>
+          <p:nvPr/>
+        </p:nvPicPr>
+        <p:blipFill>
+          <a:blip r:embed="rId3"/>
+          <a:stretch>
+            <a:fillRect/>
+          </a:stretch>
+        </p:blipFill>
+        <p:spPr>
+          <a:xfrm>
+            <a:off x="3168062" y="1728300"/>
+            <a:ext cx="2807875" cy="3155290"/>
+          </a:xfrm>
+          <a:prstGeom prst="rect">
+            <a:avLst/>
+          </a:prstGeom>
+        </p:spPr>
+      </p:pic>
     </p:spTree>
   </p:cSld>
   <p:clrMapOvr>
@@ -10615,6 +10670,66 @@
           </a:p>
         </p:txBody>
       </p:sp>
+      <p:pic>
+        <p:nvPicPr>
+          <p:cNvPr id="3" name="Picture 2" descr="Chart, scatter chart&#10;&#10;Description automatically generated">
+            <a:extLst>
+              <a:ext uri="{FF2B5EF4-FFF2-40B4-BE49-F238E27FC236}">
+                <a16:creationId xmlns:a16="http://schemas.microsoft.com/office/drawing/2014/main" id="{E1ED300E-63BB-3949-9EFD-03B1E1A9CCB5}"/>
+              </a:ext>
+            </a:extLst>
+          </p:cNvPr>
+          <p:cNvPicPr>
+            <a:picLocks noChangeAspect="1"/>
+          </p:cNvPicPr>
+          <p:nvPr/>
+        </p:nvPicPr>
+        <p:blipFill>
+          <a:blip r:embed="rId3"/>
+          <a:stretch>
+            <a:fillRect/>
+          </a:stretch>
+        </p:blipFill>
+        <p:spPr>
+          <a:xfrm>
+            <a:off x="785267" y="2019630"/>
+            <a:ext cx="2685477" cy="2845573"/>
+          </a:xfrm>
+          <a:prstGeom prst="rect">
+            <a:avLst/>
+          </a:prstGeom>
+        </p:spPr>
+      </p:pic>
+      <p:pic>
+        <p:nvPicPr>
+          <p:cNvPr id="5" name="Picture 4" descr="Chart, scatter chart&#10;&#10;Description automatically generated">
+            <a:extLst>
+              <a:ext uri="{FF2B5EF4-FFF2-40B4-BE49-F238E27FC236}">
+                <a16:creationId xmlns:a16="http://schemas.microsoft.com/office/drawing/2014/main" id="{F5E07CD0-2904-E042-998D-B13A217B4EFC}"/>
+              </a:ext>
+            </a:extLst>
+          </p:cNvPr>
+          <p:cNvPicPr>
+            <a:picLocks noChangeAspect="1"/>
+          </p:cNvPicPr>
+          <p:nvPr/>
+        </p:nvPicPr>
+        <p:blipFill>
+          <a:blip r:embed="rId4"/>
+          <a:stretch>
+            <a:fillRect/>
+          </a:stretch>
+        </p:blipFill>
+        <p:spPr>
+          <a:xfrm>
+            <a:off x="5409323" y="1914206"/>
+            <a:ext cx="2846054" cy="2950997"/>
+          </a:xfrm>
+          <a:prstGeom prst="rect">
+            <a:avLst/>
+          </a:prstGeom>
+        </p:spPr>
+      </p:pic>
     </p:spTree>
   </p:cSld>
   <p:clrMapOvr>
@@ -10703,7 +10818,7 @@
         </p:spPr>
         <p:txBody>
           <a:bodyPr spcFirstLastPara="1" wrap="square" lIns="91425" tIns="91425" rIns="91425" bIns="91425" anchor="t" anchorCtr="0">
-            <a:normAutofit/>
+            <a:normAutofit lnSpcReduction="10000"/>
           </a:bodyPr>
           <a:lstStyle/>
           <a:p>
@@ -10717,14 +10832,29 @@
               <a:buNone/>
             </a:pPr>
             <a:r>
-              <a:rPr lang="en"/>
+              <a:rPr lang="en" dirty="0"/>
               <a:t>[What two quantities does the camera matrix relate?]</a:t>
             </a:r>
-            <a:endParaRPr/>
           </a:p>
           <a:p>
             <a:pPr marL="0" lvl="0" indent="0" algn="l" rtl="0">
               <a:spcBef>
+                <a:spcPts val="0"/>
+              </a:spcBef>
+              <a:spcAft>
+                <a:spcPts val="0"/>
+              </a:spcAft>
+              <a:buNone/>
+            </a:pPr>
+            <a:r>
+              <a:rPr lang="en-US" dirty="0"/>
+              <a:t>The camera matrix relates 3D points to 2D image points.</a:t>
+            </a:r>
+            <a:endParaRPr dirty="0"/>
+          </a:p>
+          <a:p>
+            <a:pPr marL="0" lvl="0" indent="0" algn="l" rtl="0">
+              <a:spcBef>
                 <a:spcPts val="1200"/>
               </a:spcBef>
               <a:spcAft>
@@ -10732,7 +10862,7 @@
               </a:spcAft>
               <a:buNone/>
             </a:pPr>
-            <a:endParaRPr/>
+            <a:endParaRPr dirty="0"/>
           </a:p>
           <a:p>
             <a:pPr marL="0" lvl="0" indent="0" algn="l" rtl="0">
@@ -10744,7 +10874,7 @@
               </a:spcAft>
               <a:buNone/>
             </a:pPr>
-            <a:endParaRPr/>
+            <a:endParaRPr dirty="0"/>
           </a:p>
           <a:p>
             <a:pPr marL="0" lvl="0" indent="0" algn="l" rtl="0">
@@ -10757,10 +10887,48 @@
               <a:buNone/>
             </a:pPr>
             <a:r>
-              <a:rPr lang="en"/>
+              <a:rPr lang="en" dirty="0"/>
               <a:t>[What quantities can the camera matrix be decomposed into?]</a:t>
             </a:r>
-            <a:endParaRPr/>
+          </a:p>
+          <a:p>
+            <a:pPr marL="0" lvl="0" indent="0" algn="l" rtl="0">
+              <a:spcBef>
+                <a:spcPts val="1200"/>
+              </a:spcBef>
+              <a:spcAft>
+                <a:spcPts val="1200"/>
+              </a:spcAft>
+              <a:buNone/>
+            </a:pPr>
+            <a:r>
+              <a:rPr lang="en" dirty="0"/>
+              <a:t>The camera matrix can be decomposed into intrinsic and extrinsic parameters</a:t>
+            </a:r>
+          </a:p>
+          <a:p>
+            <a:pPr marL="0" lvl="0" indent="0" algn="l" rtl="0">
+              <a:spcBef>
+                <a:spcPts val="1200"/>
+              </a:spcBef>
+              <a:spcAft>
+                <a:spcPts val="1200"/>
+              </a:spcAft>
+              <a:buNone/>
+            </a:pPr>
+            <a:endParaRPr lang="en" dirty="0"/>
+          </a:p>
+          <a:p>
+            <a:pPr marL="0" lvl="0" indent="0" algn="l" rtl="0">
+              <a:spcBef>
+                <a:spcPts val="1200"/>
+              </a:spcBef>
+              <a:spcAft>
+                <a:spcPts val="1200"/>
+              </a:spcAft>
+              <a:buNone/>
+            </a:pPr>
+            <a:endParaRPr dirty="0"/>
           </a:p>
         </p:txBody>
       </p:sp>
@@ -10799,10 +10967,33 @@
               <a:buNone/>
             </a:pPr>
             <a:r>
-              <a:rPr lang="en"/>
+              <a:rPr lang="en" dirty="0"/>
               <a:t>[List any 3 factors that affect the camera projection matrix.]</a:t>
             </a:r>
-            <a:endParaRPr/>
+          </a:p>
+          <a:p>
+            <a:pPr marL="0" lvl="0" indent="0" algn="l" rtl="0">
+              <a:spcBef>
+                <a:spcPts val="0"/>
+              </a:spcBef>
+              <a:spcAft>
+                <a:spcPts val="1200"/>
+              </a:spcAft>
+              <a:buNone/>
+            </a:pPr>
+            <a:r>
+              <a:rPr lang="en" dirty="0"/>
+              <a:t>Focal </a:t>
+            </a:r>
+            <a:r>
+              <a:rPr lang="en" dirty="0" err="1"/>
+              <a:t>legth</a:t>
+            </a:r>
+            <a:r>
+              <a:rPr lang="en" dirty="0"/>
+              <a:t>, principal point offset, and axis skew</a:t>
+            </a:r>
+            <a:endParaRPr dirty="0"/>
           </a:p>
         </p:txBody>
       </p:sp>
@@ -10915,6 +11106,36 @@
           </a:p>
         </p:txBody>
       </p:sp>
+      <p:pic>
+        <p:nvPicPr>
+          <p:cNvPr id="3" name="Picture 2" descr="A picture containing text, indoor, screenshot&#10;&#10;Description automatically generated">
+            <a:extLst>
+              <a:ext uri="{FF2B5EF4-FFF2-40B4-BE49-F238E27FC236}">
+                <a16:creationId xmlns:a16="http://schemas.microsoft.com/office/drawing/2014/main" id="{387AF1D1-2690-7E42-A92F-46D52B7ED53C}"/>
+              </a:ext>
+            </a:extLst>
+          </p:cNvPr>
+          <p:cNvPicPr>
+            <a:picLocks noChangeAspect="1"/>
+          </p:cNvPicPr>
+          <p:nvPr/>
+        </p:nvPicPr>
+        <p:blipFill>
+          <a:blip r:embed="rId3"/>
+          <a:stretch>
+            <a:fillRect/>
+          </a:stretch>
+        </p:blipFill>
+        <p:spPr>
+          <a:xfrm>
+            <a:off x="682360" y="1749964"/>
+            <a:ext cx="7779280" cy="2686370"/>
+          </a:xfrm>
+          <a:prstGeom prst="rect">
+            <a:avLst/>
+          </a:prstGeom>
+        </p:spPr>
+      </p:pic>
     </p:spTree>
   </p:cSld>
   <p:clrMapOvr>
@@ -11017,10 +11238,68 @@
               <a:buNone/>
             </a:pPr>
             <a:r>
-              <a:rPr lang="en"/>
-              <a:t>[Why is it that points in one image are projected by the fundamental matrix onto epipolar lines in the other image?]</a:t>
+              <a:rPr lang="en" dirty="0"/>
+              <a:t>[Why is it that points in one image are projected by the fundamental matrix onto </a:t>
             </a:r>
-            <a:endParaRPr/>
+            <a:r>
+              <a:rPr lang="en" dirty="0" err="1"/>
+              <a:t>epipolar</a:t>
+            </a:r>
+            <a:r>
+              <a:rPr lang="en" dirty="0"/>
+              <a:t> lines in the other image?]</a:t>
+            </a:r>
+          </a:p>
+          <a:p>
+            <a:pPr marL="0" lvl="0" indent="0" algn="l" rtl="0">
+              <a:spcBef>
+                <a:spcPts val="0"/>
+              </a:spcBef>
+              <a:spcAft>
+                <a:spcPts val="1200"/>
+              </a:spcAft>
+              <a:buNone/>
+            </a:pPr>
+            <a:r>
+              <a:rPr lang="en" dirty="0"/>
+              <a:t>The fundamental matrix F maps a point in </a:t>
+            </a:r>
+            <a:r>
+              <a:rPr lang="en" dirty="0" err="1"/>
+              <a:t>image_a</a:t>
+            </a:r>
+            <a:r>
+              <a:rPr lang="en" dirty="0"/>
+              <a:t> to a corresponding </a:t>
+            </a:r>
+            <a:r>
+              <a:rPr lang="en" dirty="0" err="1"/>
+              <a:t>epipolar</a:t>
+            </a:r>
+            <a:r>
+              <a:rPr lang="en" dirty="0"/>
+              <a:t> line connecting a point on </a:t>
+            </a:r>
+            <a:r>
+              <a:rPr lang="en" dirty="0" err="1"/>
+              <a:t>image_b</a:t>
+            </a:r>
+            <a:r>
+              <a:rPr lang="en" dirty="0"/>
+              <a:t>. </a:t>
+            </a:r>
+          </a:p>
+          <a:p>
+            <a:pPr marL="0" lvl="0" indent="0" algn="l" rtl="0">
+              <a:spcBef>
+                <a:spcPts val="0"/>
+              </a:spcBef>
+              <a:spcAft>
+                <a:spcPts val="1200"/>
+              </a:spcAft>
+              <a:buNone/>
+            </a:pPr>
+            <a:endParaRPr dirty="0"/>
           </a:p>
         </p:txBody>
       </p:sp>
@@ -11067,7 +11346,31 @@
               <a:rPr lang="en" dirty="0"/>
               <a:t>[How many minimum points do we need to estimate the Fundamental matrix. Explain?]</a:t>
             </a:r>
-            <a:endParaRPr dirty="0"/>
+          </a:p>
+          <a:p>
+            <a:pPr marL="0" lvl="0" indent="0" algn="l" rtl="0">
+              <a:spcBef>
+                <a:spcPts val="0"/>
+              </a:spcBef>
+              <a:spcAft>
+                <a:spcPts val="1200"/>
+              </a:spcAft>
+              <a:buClr>
+                <a:schemeClr val="dk1"/>
+              </a:buClr>
+              <a:buSzPts val="1100"/>
+              <a:buFont typeface="Arial"/>
+              <a:buNone/>
+            </a:pPr>
+            <a:r>
+              <a:rPr lang="en" dirty="0"/>
+              <a:t>8 points are needed to compute the fundamental matrix. This is because there are 8 different point pair combinations used to solve for the </a:t>
+            </a:r>
+            <a:r>
+              <a:rPr lang="en"/>
+              <a:t>Fundamental matrix.</a:t>
+            </a:r>
+            <a:endParaRPr lang="en" dirty="0"/>
           </a:p>
         </p:txBody>
       </p:sp>
@@ -11159,7 +11462,7 @@
         </p:spPr>
         <p:txBody>
           <a:bodyPr spcFirstLastPara="1" wrap="square" lIns="91425" tIns="91425" rIns="91425" bIns="91425" anchor="t" anchorCtr="0">
-            <a:normAutofit/>
+            <a:normAutofit fontScale="85000" lnSpcReduction="10000"/>
           </a:bodyPr>
           <a:lstStyle/>
           <a:p>
@@ -11189,12 +11492,11 @@
               <a:rPr lang="en" dirty="0"/>
               <a:t> lines are all horizontal across the two images?]</a:t>
             </a:r>
-            <a:endParaRPr dirty="0"/>
           </a:p>
           <a:p>
             <a:pPr marL="0" lvl="0" indent="0" algn="l" rtl="0">
               <a:spcBef>
-                <a:spcPts val="1200"/>
+                <a:spcPts val="0"/>
               </a:spcBef>
               <a:spcAft>
                 <a:spcPts val="0"/>
@@ -11206,12 +11508,12 @@
               <a:buFont typeface="Arial"/>
               <a:buNone/>
             </a:pPr>
-            <a:endParaRPr dirty="0"/>
+            <a:endParaRPr lang="en" dirty="0"/>
           </a:p>
           <a:p>
             <a:pPr marL="0" lvl="0" indent="0" algn="l" rtl="0">
               <a:spcBef>
-                <a:spcPts val="1200"/>
+                <a:spcPts val="0"/>
               </a:spcBef>
               <a:spcAft>
                 <a:spcPts val="0"/>
@@ -11223,6 +11525,10 @@
               <a:buFont typeface="Arial"/>
               <a:buNone/>
             </a:pPr>
+            <a:r>
+              <a:rPr lang="en-US" dirty="0"/>
+              <a:t>It means that the points in both images that correspond to each other can be found by looking only along a horizontal line.</a:t>
+            </a:r>
             <a:endParaRPr dirty="0"/>
           </a:p>
           <a:p>
@@ -11257,9 +11563,54 @@
               <a:buFont typeface="Arial"/>
               <a:buNone/>
             </a:pPr>
+            <a:endParaRPr dirty="0"/>
+          </a:p>
+          <a:p>
+            <a:pPr marL="0" lvl="0" indent="0" algn="l" rtl="0">
+              <a:spcBef>
+                <a:spcPts val="1200"/>
+              </a:spcBef>
+              <a:spcAft>
+                <a:spcPts val="0"/>
+              </a:spcAft>
+              <a:buClr>
+                <a:schemeClr val="dk1"/>
+              </a:buClr>
+              <a:buSzPts val="1100"/>
+              <a:buFont typeface="Arial"/>
+              <a:buNone/>
+            </a:pPr>
             <a:r>
               <a:rPr lang="en" dirty="0"/>
               <a:t>[Why is the fundamental matrix defined up to a scale?] (Hint: you can reason using the equation for F)</a:t>
+            </a:r>
+          </a:p>
+          <a:p>
+            <a:pPr marL="0" lvl="0" indent="0" algn="l" rtl="0">
+              <a:spcBef>
+                <a:spcPts val="1200"/>
+              </a:spcBef>
+              <a:spcAft>
+                <a:spcPts val="0"/>
+              </a:spcAft>
+              <a:buClr>
+                <a:schemeClr val="dk1"/>
+              </a:buClr>
+              <a:buSzPts val="1100"/>
+              <a:buFont typeface="Arial"/>
+              <a:buNone/>
+            </a:pPr>
+            <a:r>
+              <a:rPr lang="en" dirty="0"/>
+              <a:t>Since the equation that solves for F (</a:t>
+            </a:r>
+            <a:r>
+              <a:rPr lang="en" dirty="0" err="1"/>
+              <a:t>x^T</a:t>
+            </a:r>
+            <a:r>
+              <a:rPr lang="en" dirty="0"/>
+              <a:t> * F * x = 0) can be multiplied by any scalar to solve it. So, a scale is fixed to arrive at a single unique solution.</a:t>
             </a:r>
             <a:endParaRPr dirty="0"/>
           </a:p>
@@ -11312,10 +11663,24 @@
               <a:buNone/>
             </a:pPr>
             <a:r>
-              <a:rPr lang="en"/>
+              <a:rPr lang="en" dirty="0"/>
               <a:t>[Why is the fundamental matrix rank 2?]</a:t>
             </a:r>
-            <a:endParaRPr/>
+          </a:p>
+          <a:p>
+            <a:pPr marL="0" lvl="0" indent="0" algn="l" rtl="0">
+              <a:spcBef>
+                <a:spcPts val="0"/>
+              </a:spcBef>
+              <a:spcAft>
+                <a:spcPts val="1200"/>
+              </a:spcAft>
+              <a:buNone/>
+            </a:pPr>
+            <a:r>
+              <a:rPr lang="en" dirty="0"/>
+              <a:t>F represents a mapping from 2-dimensional space to 1-dimensional projective space. Hence, it must should have rank 2.</a:t>
+            </a:r>
           </a:p>
         </p:txBody>
       </p:sp>

</xml_diff>